<commit_message>
新增 AWS, Azure 教學
</commit_message>
<xml_diff>
--- a/apache/data/hielo/ppt/LinkIt7688Duo.pptx
+++ b/apache/data/hielo/ppt/LinkIt7688Duo.pptx
@@ -5,7 +5,7 @@
     <p:sldMasterId id="2147483648" r:id="rId1"/>
   </p:sldMasterIdLst>
   <p:notesMasterIdLst>
-    <p:notesMasterId r:id="rId51"/>
+    <p:notesMasterId r:id="rId53"/>
   </p:notesMasterIdLst>
   <p:sldIdLst>
     <p:sldId id="410" r:id="rId2"/>
@@ -49,14 +49,16 @@
     <p:sldId id="413" r:id="rId40"/>
     <p:sldId id="414" r:id="rId41"/>
     <p:sldId id="423" r:id="rId42"/>
-    <p:sldId id="415" r:id="rId43"/>
-    <p:sldId id="416" r:id="rId44"/>
-    <p:sldId id="417" r:id="rId45"/>
-    <p:sldId id="418" r:id="rId46"/>
-    <p:sldId id="420" r:id="rId47"/>
-    <p:sldId id="421" r:id="rId48"/>
-    <p:sldId id="419" r:id="rId49"/>
-    <p:sldId id="422" r:id="rId50"/>
+    <p:sldId id="425" r:id="rId43"/>
+    <p:sldId id="426" r:id="rId44"/>
+    <p:sldId id="415" r:id="rId45"/>
+    <p:sldId id="416" r:id="rId46"/>
+    <p:sldId id="417" r:id="rId47"/>
+    <p:sldId id="418" r:id="rId48"/>
+    <p:sldId id="420" r:id="rId49"/>
+    <p:sldId id="421" r:id="rId50"/>
+    <p:sldId id="419" r:id="rId51"/>
+    <p:sldId id="422" r:id="rId52"/>
   </p:sldIdLst>
   <p:sldSz cx="12192000" cy="6858000"/>
   <p:notesSz cx="6858000" cy="9144000"/>
@@ -217,6 +219,8 @@
             <p14:sldId id="413"/>
             <p14:sldId id="414"/>
             <p14:sldId id="423"/>
+            <p14:sldId id="425"/>
+            <p14:sldId id="426"/>
             <p14:sldId id="415"/>
             <p14:sldId id="416"/>
             <p14:sldId id="417"/>
@@ -318,7 +322,7 @@
           <a:p>
             <a:fld id="{022B82A7-2268-430F-ABCF-58AE7E6F0C10}" type="datetimeFigureOut">
               <a:rPr lang="zh-TW" altLang="en-US" smtClean="0"/>
-              <a:t>2020/9/14</a:t>
+              <a:t>2020/9/30</a:t>
             </a:fld>
             <a:endParaRPr lang="zh-TW" altLang="en-US"/>
           </a:p>
@@ -2554,7 +2558,7 @@
           <a:p>
             <a:fld id="{3CCC8C8D-3867-4C0F-B970-A21CD581CCCB}" type="datetime1">
               <a:rPr lang="zh-TW" altLang="en-US" smtClean="0"/>
-              <a:t>2020/9/14</a:t>
+              <a:t>2020/9/30</a:t>
             </a:fld>
             <a:endParaRPr lang="zh-TW" altLang="en-US"/>
           </a:p>
@@ -2752,7 +2756,7 @@
           <a:p>
             <a:fld id="{F1288E87-39B1-4109-8754-5498FB15705B}" type="datetime1">
               <a:rPr lang="zh-TW" altLang="en-US" smtClean="0"/>
-              <a:t>2020/9/14</a:t>
+              <a:t>2020/9/30</a:t>
             </a:fld>
             <a:endParaRPr lang="zh-TW" altLang="en-US"/>
           </a:p>
@@ -2960,7 +2964,7 @@
           <a:p>
             <a:fld id="{048B5EA0-716E-4015-AF26-B5F653C319D6}" type="datetime1">
               <a:rPr lang="zh-TW" altLang="en-US" smtClean="0"/>
-              <a:t>2020/9/14</a:t>
+              <a:t>2020/9/30</a:t>
             </a:fld>
             <a:endParaRPr lang="zh-TW" altLang="en-US"/>
           </a:p>
@@ -3158,7 +3162,7 @@
           <a:p>
             <a:fld id="{00C86FDA-9B1E-4C74-AEF7-8E6B0584E4AB}" type="datetime1">
               <a:rPr lang="zh-TW" altLang="en-US" smtClean="0"/>
-              <a:t>2020/9/14</a:t>
+              <a:t>2020/9/30</a:t>
             </a:fld>
             <a:endParaRPr lang="zh-TW" altLang="en-US"/>
           </a:p>
@@ -3433,7 +3437,7 @@
           <a:p>
             <a:fld id="{D785C14F-DA87-4E83-86AA-7BCD8C6DB75E}" type="datetime1">
               <a:rPr lang="zh-TW" altLang="en-US" smtClean="0"/>
-              <a:t>2020/9/14</a:t>
+              <a:t>2020/9/30</a:t>
             </a:fld>
             <a:endParaRPr lang="zh-TW" altLang="en-US"/>
           </a:p>
@@ -3698,7 +3702,7 @@
           <a:p>
             <a:fld id="{5C48B5F3-01F6-41E2-B898-951733968E81}" type="datetime1">
               <a:rPr lang="zh-TW" altLang="en-US" smtClean="0"/>
-              <a:t>2020/9/14</a:t>
+              <a:t>2020/9/30</a:t>
             </a:fld>
             <a:endParaRPr lang="zh-TW" altLang="en-US"/>
           </a:p>
@@ -4110,7 +4114,7 @@
           <a:p>
             <a:fld id="{501980B4-C3FD-4434-A204-98C4A3D37E85}" type="datetime1">
               <a:rPr lang="zh-TW" altLang="en-US" smtClean="0"/>
-              <a:t>2020/9/14</a:t>
+              <a:t>2020/9/30</a:t>
             </a:fld>
             <a:endParaRPr lang="zh-TW" altLang="en-US"/>
           </a:p>
@@ -4251,7 +4255,7 @@
           <a:p>
             <a:fld id="{2C9D5915-6BC8-4F46-8BE4-0339AFBD3265}" type="datetime1">
               <a:rPr lang="zh-TW" altLang="en-US" smtClean="0"/>
-              <a:t>2020/9/14</a:t>
+              <a:t>2020/9/30</a:t>
             </a:fld>
             <a:endParaRPr lang="zh-TW" altLang="en-US"/>
           </a:p>
@@ -4364,7 +4368,7 @@
           <a:p>
             <a:fld id="{D389159B-E977-4170-92C8-DA5E1DA1210A}" type="datetime1">
               <a:rPr lang="zh-TW" altLang="en-US" smtClean="0"/>
-              <a:t>2020/9/14</a:t>
+              <a:t>2020/9/30</a:t>
             </a:fld>
             <a:endParaRPr lang="zh-TW" altLang="en-US"/>
           </a:p>
@@ -4675,7 +4679,7 @@
           <a:p>
             <a:fld id="{537ADB86-A54D-4D01-8CC7-E632202986E1}" type="datetime1">
               <a:rPr lang="zh-TW" altLang="en-US" smtClean="0"/>
-              <a:t>2020/9/14</a:t>
+              <a:t>2020/9/30</a:t>
             </a:fld>
             <a:endParaRPr lang="zh-TW" altLang="en-US"/>
           </a:p>
@@ -4963,7 +4967,7 @@
           <a:p>
             <a:fld id="{DD3E70E5-4C33-4DC2-9460-E4B5A8EB5B6D}" type="datetime1">
               <a:rPr lang="zh-TW" altLang="en-US" smtClean="0"/>
-              <a:t>2020/9/14</a:t>
+              <a:t>2020/9/30</a:t>
             </a:fld>
             <a:endParaRPr lang="zh-TW" altLang="en-US"/>
           </a:p>
@@ -5204,7 +5208,7 @@
           <a:p>
             <a:fld id="{54123BBB-7905-4E78-83F3-4CA756A33C4D}" type="datetime1">
               <a:rPr lang="zh-TW" altLang="en-US" smtClean="0"/>
-              <a:t>2020/9/14</a:t>
+              <a:t>2020/9/30</a:t>
             </a:fld>
             <a:endParaRPr lang="zh-TW" altLang="en-US"/>
           </a:p>
@@ -15282,19 +15286,13 @@
             </a:pPr>
             <a:r>
               <a:rPr lang="en-US" altLang="zh-TW" dirty="0"/>
-              <a:t>Find and download the </a:t>
-            </a:r>
-            <a:r>
-              <a:rPr lang="en-US" altLang="zh-TW" dirty="0" err="1">
-                <a:hlinkClick r:id="rId2"/>
-              </a:rPr>
-              <a:t>Seeed</a:t>
+              <a:t>Download the </a:t>
             </a:r>
             <a:r>
               <a:rPr lang="en-US" altLang="zh-TW" dirty="0">
                 <a:hlinkClick r:id="rId2"/>
               </a:rPr>
-              <a:t> DHT library</a:t>
+              <a:t>DHT example code</a:t>
             </a:r>
             <a:r>
               <a:rPr lang="en-US" altLang="zh-TW" dirty="0"/>
@@ -15315,7 +15313,7 @@
               <a:rPr lang="en-US" altLang="zh-TW" dirty="0">
                 <a:hlinkClick r:id="rId3" action="ppaction://hlinksldjump"/>
               </a:rPr>
-              <a:t>Install library for Arduino IDE</a:t>
+              <a:t>Install DHT library for Arduino IDE</a:t>
             </a:r>
             <a:endParaRPr lang="en-US" altLang="zh-TW" dirty="0"/>
           </a:p>
@@ -15374,7 +15372,7 @@
             </a:pPr>
             <a:r>
               <a:rPr lang="en-US" altLang="zh-TW" dirty="0">
-                <a:hlinkClick r:id="rId3" action="ppaction://hlinksldjump"/>
+                <a:hlinkClick r:id="rId6" action="ppaction://hlinksldjump"/>
               </a:rPr>
               <a:t>Install library for Arduino IDE</a:t>
             </a:r>
@@ -15407,7 +15405,7 @@
             </a:pPr>
             <a:r>
               <a:rPr lang="en-US" altLang="zh-TW" dirty="0">
-                <a:hlinkClick r:id="rId6" action="ppaction://hlinksldjump"/>
+                <a:hlinkClick r:id="rId7" action="ppaction://hlinksldjump"/>
               </a:rPr>
               <a:t>Write &amp; test the code</a:t>
             </a:r>
@@ -15752,7 +15750,7 @@
           <p:cNvPr id="2" name="標題 1">
             <a:extLst>
               <a:ext uri="{FF2B5EF4-FFF2-40B4-BE49-F238E27FC236}">
-                <a16:creationId xmlns:a16="http://schemas.microsoft.com/office/drawing/2014/main" id="{12CC0939-B433-41DE-8EB4-BDC89A97CB1A}"/>
+                <a16:creationId xmlns:a16="http://schemas.microsoft.com/office/drawing/2014/main" id="{2EA216AB-4A13-4C79-A58C-023EA3A582E7}"/>
               </a:ext>
             </a:extLst>
           </p:cNvPr>
@@ -15770,85 +15768,29 @@
           <a:p>
             <a:r>
               <a:rPr lang="en-US" altLang="zh-TW" dirty="0"/>
-              <a:t>How to install library for Arduino IDE</a:t>
+              <a:t>Install DHT library in Library manager</a:t>
             </a:r>
             <a:endParaRPr lang="zh-TW" altLang="en-US" dirty="0"/>
-          </a:p>
-        </p:txBody>
-      </p:sp>
-      <p:sp>
-        <p:nvSpPr>
-          <p:cNvPr id="3" name="內容版面配置區 2">
-            <a:extLst>
-              <a:ext uri="{FF2B5EF4-FFF2-40B4-BE49-F238E27FC236}">
-                <a16:creationId xmlns:a16="http://schemas.microsoft.com/office/drawing/2014/main" id="{77E36F70-519A-40E9-83CC-D1E1170FE4E8}"/>
-              </a:ext>
-            </a:extLst>
-          </p:cNvPr>
-          <p:cNvSpPr>
-            <a:spLocks noGrp="1"/>
-          </p:cNvSpPr>
-          <p:nvPr>
-            <p:ph idx="1"/>
-          </p:nvPr>
-        </p:nvSpPr>
-        <p:spPr/>
-        <p:txBody>
-          <a:bodyPr/>
-          <a:lstStyle/>
-          <a:p>
-            <a:r>
-              <a:rPr lang="en-US" altLang="zh-TW" dirty="0"/>
-              <a:t>Most components for Arduino can find its wiki page and </a:t>
-            </a:r>
-            <a:r>
-              <a:rPr lang="en-US" altLang="zh-TW" dirty="0" err="1"/>
-              <a:t>Github</a:t>
-            </a:r>
-            <a:endParaRPr lang="en-US" altLang="zh-TW" dirty="0"/>
-          </a:p>
-          <a:p>
-            <a:pPr marL="514350" indent="-514350">
-              <a:buFont typeface="+mj-lt"/>
-              <a:buAutoNum type="arabicPeriod"/>
-            </a:pPr>
-            <a:r>
-              <a:rPr lang="en-US" altLang="zh-TW" dirty="0"/>
-              <a:t>Download form its </a:t>
-            </a:r>
-            <a:r>
-              <a:rPr lang="en-US" altLang="zh-TW" dirty="0" err="1"/>
-              <a:t>Github</a:t>
-            </a:r>
-            <a:br>
-              <a:rPr lang="en-US" altLang="zh-TW" dirty="0"/>
-            </a:br>
-            <a:endParaRPr lang="en-US" altLang="zh-TW" dirty="0"/>
-          </a:p>
-          <a:p>
-            <a:pPr marL="514350" indent="-514350">
-              <a:buFont typeface="+mj-lt"/>
-              <a:buAutoNum type="arabicPeriod"/>
-            </a:pPr>
-            <a:endParaRPr lang="en-US" altLang="zh-TW" dirty="0"/>
           </a:p>
         </p:txBody>
       </p:sp>
       <p:pic>
         <p:nvPicPr>
-          <p:cNvPr id="12" name="圖片 11">
-            <a:extLst>
-              <a:ext uri="{FF2B5EF4-FFF2-40B4-BE49-F238E27FC236}">
-                <a16:creationId xmlns:a16="http://schemas.microsoft.com/office/drawing/2014/main" id="{F65A24CB-6745-4ED1-A4A5-6BBD00F874F6}"/>
+          <p:cNvPr id="7" name="內容版面配置區 6">
+            <a:extLst>
+              <a:ext uri="{FF2B5EF4-FFF2-40B4-BE49-F238E27FC236}">
+                <a16:creationId xmlns:a16="http://schemas.microsoft.com/office/drawing/2014/main" id="{34789DFF-39E0-4BE0-AC3F-20B689A48293}"/>
               </a:ext>
             </a:extLst>
           </p:cNvPr>
           <p:cNvPicPr>
-            <a:picLocks noChangeAspect="1"/>
+            <a:picLocks noGrp="1" noChangeAspect="1"/>
           </p:cNvPicPr>
-          <p:nvPr/>
+          <p:nvPr>
+            <p:ph idx="1"/>
+          </p:nvPr>
         </p:nvPicPr>
-        <p:blipFill>
+        <p:blipFill rotWithShape="1">
           <a:blip r:embed="rId2">
             <a:extLst>
               <a:ext uri="{28A0092B-C50C-407E-A947-70E740481C1C}">
@@ -15856,26 +15798,14 @@
               </a:ext>
             </a:extLst>
           </a:blip>
-          <a:stretch>
-            <a:fillRect/>
-          </a:stretch>
+          <a:srcRect t="1224" r="53863" b="39537"/>
+          <a:stretch/>
         </p:blipFill>
         <p:spPr>
           <a:xfrm>
-            <a:off x="1439475" y="2882396"/>
-            <a:ext cx="7306695" cy="3610479"/>
+            <a:off x="2538862" y="1502421"/>
+            <a:ext cx="6720547" cy="4853929"/>
           </a:xfrm>
-          <a:prstGeom prst="rect">
-            <a:avLst/>
-          </a:prstGeom>
-          <a:ln w="28575">
-            <a:solidFill>
-              <a:schemeClr val="tx1">
-                <a:lumMod val="50000"/>
-                <a:lumOff val="50000"/>
-              </a:schemeClr>
-            </a:solidFill>
-          </a:ln>
         </p:spPr>
       </p:pic>
       <p:sp>
@@ -15883,7 +15813,7 @@
           <p:cNvPr id="4" name="投影片編號版面配置區 3">
             <a:extLst>
               <a:ext uri="{FF2B5EF4-FFF2-40B4-BE49-F238E27FC236}">
-                <a16:creationId xmlns:a16="http://schemas.microsoft.com/office/drawing/2014/main" id="{AFE6928E-F101-437A-A225-15F71DC6659A}"/>
+                <a16:creationId xmlns:a16="http://schemas.microsoft.com/office/drawing/2014/main" id="{742641F3-C75F-403F-BC53-CB32C71CD712}"/>
               </a:ext>
             </a:extLst>
           </p:cNvPr>
@@ -15910,7 +15840,7 @@
     </p:spTree>
     <p:extLst>
       <p:ext uri="{BB962C8B-B14F-4D97-AF65-F5344CB8AC3E}">
-        <p14:creationId xmlns:p14="http://schemas.microsoft.com/office/powerpoint/2010/main" val="4238003250"/>
+        <p14:creationId xmlns:p14="http://schemas.microsoft.com/office/powerpoint/2010/main" val="425786836"/>
       </p:ext>
     </p:extLst>
   </p:cSld>
@@ -15942,7 +15872,7 @@
           <p:cNvPr id="2" name="標題 1">
             <a:extLst>
               <a:ext uri="{FF2B5EF4-FFF2-40B4-BE49-F238E27FC236}">
-                <a16:creationId xmlns:a16="http://schemas.microsoft.com/office/drawing/2014/main" id="{1F518B19-5CE4-4E9E-ABA9-EADE29DE5761}"/>
+                <a16:creationId xmlns:a16="http://schemas.microsoft.com/office/drawing/2014/main" id="{1B293C4E-7490-46E9-A20D-8D2673DEEBED}"/>
               </a:ext>
             </a:extLst>
           </p:cNvPr>
@@ -15960,40 +15890,7 @@
           <a:p>
             <a:r>
               <a:rPr lang="en-US" altLang="zh-TW" dirty="0"/>
-              <a:t>How to install library for Arduino IDE</a:t>
-            </a:r>
-            <a:endParaRPr lang="zh-TW" altLang="en-US" dirty="0"/>
-          </a:p>
-        </p:txBody>
-      </p:sp>
-      <p:sp>
-        <p:nvSpPr>
-          <p:cNvPr id="3" name="內容版面配置區 2">
-            <a:extLst>
-              <a:ext uri="{FF2B5EF4-FFF2-40B4-BE49-F238E27FC236}">
-                <a16:creationId xmlns:a16="http://schemas.microsoft.com/office/drawing/2014/main" id="{3686DCE9-A502-4B3A-8682-B9B4829522D3}"/>
-              </a:ext>
-            </a:extLst>
-          </p:cNvPr>
-          <p:cNvSpPr>
-            <a:spLocks noGrp="1"/>
-          </p:cNvSpPr>
-          <p:nvPr>
-            <p:ph idx="1"/>
-          </p:nvPr>
-        </p:nvSpPr>
-        <p:spPr/>
-        <p:txBody>
-          <a:bodyPr/>
-          <a:lstStyle/>
-          <a:p>
-            <a:pPr marL="514350" indent="-514350">
-              <a:buFont typeface="+mj-lt"/>
-              <a:buAutoNum type="arabicPeriod" startAt="2"/>
-            </a:pPr>
-            <a:r>
-              <a:rPr lang="en-US" altLang="zh-TW" dirty="0"/>
-              <a:t>Add the library</a:t>
+              <a:t>Install DHT library in Library manager</a:t>
             </a:r>
             <a:endParaRPr lang="zh-TW" altLang="en-US" dirty="0"/>
           </a:p>
@@ -16001,19 +15898,21 @@
       </p:sp>
       <p:pic>
         <p:nvPicPr>
-          <p:cNvPr id="7" name="圖片 6">
-            <a:extLst>
-              <a:ext uri="{FF2B5EF4-FFF2-40B4-BE49-F238E27FC236}">
-                <a16:creationId xmlns:a16="http://schemas.microsoft.com/office/drawing/2014/main" id="{CE2B6A8B-4144-4942-B695-2FF67F454BA2}"/>
+          <p:cNvPr id="6" name="內容版面配置區 5">
+            <a:extLst>
+              <a:ext uri="{FF2B5EF4-FFF2-40B4-BE49-F238E27FC236}">
+                <a16:creationId xmlns:a16="http://schemas.microsoft.com/office/drawing/2014/main" id="{A6F31944-519C-4395-AD7F-0CBB173A8AE3}"/>
               </a:ext>
             </a:extLst>
           </p:cNvPr>
           <p:cNvPicPr>
-            <a:picLocks noChangeAspect="1"/>
+            <a:picLocks noGrp="1" noChangeAspect="1"/>
           </p:cNvPicPr>
-          <p:nvPr/>
+          <p:nvPr>
+            <p:ph idx="1"/>
+          </p:nvPr>
         </p:nvPicPr>
-        <p:blipFill>
+        <p:blipFill rotWithShape="1">
           <a:blip r:embed="rId2">
             <a:extLst>
               <a:ext uri="{28A0092B-C50C-407E-A947-70E740481C1C}">
@@ -16021,18 +15920,14 @@
               </a:ext>
             </a:extLst>
           </a:blip>
-          <a:stretch>
-            <a:fillRect/>
-          </a:stretch>
+          <a:srcRect l="-113" t="-335" r="25288" b="24642"/>
+          <a:stretch/>
         </p:blipFill>
         <p:spPr>
           <a:xfrm>
-            <a:off x="1419624" y="2364624"/>
-            <a:ext cx="7133333" cy="4028571"/>
+            <a:off x="1225119" y="1257778"/>
+            <a:ext cx="8861671" cy="5042454"/>
           </a:xfrm>
-          <a:prstGeom prst="rect">
-            <a:avLst/>
-          </a:prstGeom>
         </p:spPr>
       </p:pic>
       <p:sp>
@@ -16040,7 +15935,7 @@
           <p:cNvPr id="4" name="投影片編號版面配置區 3">
             <a:extLst>
               <a:ext uri="{FF2B5EF4-FFF2-40B4-BE49-F238E27FC236}">
-                <a16:creationId xmlns:a16="http://schemas.microsoft.com/office/drawing/2014/main" id="{4DE14F45-F8B1-40F0-8668-DCD14BB0EA78}"/>
+                <a16:creationId xmlns:a16="http://schemas.microsoft.com/office/drawing/2014/main" id="{A974694A-26DB-4D8C-A7AF-15A2146D6018}"/>
               </a:ext>
             </a:extLst>
           </p:cNvPr>
@@ -16067,7 +15962,7 @@
     </p:spTree>
     <p:extLst>
       <p:ext uri="{BB962C8B-B14F-4D97-AF65-F5344CB8AC3E}">
-        <p14:creationId xmlns:p14="http://schemas.microsoft.com/office/powerpoint/2010/main" val="3211620007"/>
+        <p14:creationId xmlns:p14="http://schemas.microsoft.com/office/powerpoint/2010/main" val="4244423027"/>
       </p:ext>
     </p:extLst>
   </p:cSld>
@@ -16099,7 +15994,7 @@
           <p:cNvPr id="2" name="標題 1">
             <a:extLst>
               <a:ext uri="{FF2B5EF4-FFF2-40B4-BE49-F238E27FC236}">
-                <a16:creationId xmlns:a16="http://schemas.microsoft.com/office/drawing/2014/main" id="{9564A15C-84C2-4625-86FE-E47D0298E067}"/>
+                <a16:creationId xmlns:a16="http://schemas.microsoft.com/office/drawing/2014/main" id="{12CC0939-B433-41DE-8EB4-BDC89A97CB1A}"/>
               </a:ext>
             </a:extLst>
           </p:cNvPr>
@@ -16112,98 +16007,91 @@
         </p:nvSpPr>
         <p:spPr/>
         <p:txBody>
+          <a:bodyPr>
+            <a:normAutofit/>
+          </a:bodyPr>
+          <a:lstStyle/>
+          <a:p>
+            <a:r>
+              <a:rPr lang="en-US" altLang="zh-TW" sz="4000" dirty="0"/>
+              <a:t>How to install</a:t>
+            </a:r>
+            <a:r>
+              <a:rPr lang="zh-TW" altLang="en-US" sz="4000" dirty="0"/>
+              <a:t> </a:t>
+            </a:r>
+            <a:r>
+              <a:rPr lang="en-US" altLang="zh-TW" sz="4000" dirty="0"/>
+              <a:t>custom library for Arduino IDE</a:t>
+            </a:r>
+            <a:endParaRPr lang="zh-TW" altLang="en-US" sz="4000" dirty="0"/>
+          </a:p>
+        </p:txBody>
+      </p:sp>
+      <p:sp>
+        <p:nvSpPr>
+          <p:cNvPr id="3" name="內容版面配置區 2">
+            <a:extLst>
+              <a:ext uri="{FF2B5EF4-FFF2-40B4-BE49-F238E27FC236}">
+                <a16:creationId xmlns:a16="http://schemas.microsoft.com/office/drawing/2014/main" id="{77E36F70-519A-40E9-83CC-D1E1170FE4E8}"/>
+              </a:ext>
+            </a:extLst>
+          </p:cNvPr>
+          <p:cNvSpPr>
+            <a:spLocks noGrp="1"/>
+          </p:cNvSpPr>
+          <p:nvPr>
+            <p:ph idx="1"/>
+          </p:nvPr>
+        </p:nvSpPr>
+        <p:spPr/>
+        <p:txBody>
           <a:bodyPr/>
           <a:lstStyle/>
           <a:p>
             <a:r>
               <a:rPr lang="en-US" altLang="zh-TW" dirty="0"/>
-              <a:t>How to install library for Arduino IDE</a:t>
-            </a:r>
-            <a:endParaRPr lang="zh-TW" altLang="en-US" dirty="0"/>
-          </a:p>
-        </p:txBody>
-      </p:sp>
-      <p:sp>
-        <p:nvSpPr>
-          <p:cNvPr id="3" name="內容版面配置區 2">
-            <a:extLst>
-              <a:ext uri="{FF2B5EF4-FFF2-40B4-BE49-F238E27FC236}">
-                <a16:creationId xmlns:a16="http://schemas.microsoft.com/office/drawing/2014/main" id="{2DC0AEA2-67E8-4505-BE38-35BC4C47456E}"/>
-              </a:ext>
-            </a:extLst>
-          </p:cNvPr>
-          <p:cNvSpPr>
-            <a:spLocks noGrp="1"/>
-          </p:cNvSpPr>
-          <p:nvPr>
-            <p:ph idx="1"/>
-          </p:nvPr>
-        </p:nvSpPr>
-        <p:spPr/>
-        <p:txBody>
-          <a:bodyPr/>
-          <a:lstStyle/>
+              <a:t>Most components for Arduino can find its wiki page and </a:t>
+            </a:r>
+            <a:r>
+              <a:rPr lang="en-US" altLang="zh-TW" dirty="0" err="1"/>
+              <a:t>Github</a:t>
+            </a:r>
+            <a:endParaRPr lang="en-US" altLang="zh-TW" dirty="0"/>
+          </a:p>
           <a:p>
             <a:pPr marL="514350" indent="-514350">
               <a:buFont typeface="+mj-lt"/>
-              <a:buAutoNum type="arabicPeriod" startAt="3"/>
+              <a:buAutoNum type="arabicPeriod"/>
             </a:pPr>
             <a:r>
               <a:rPr lang="en-US" altLang="zh-TW" dirty="0"/>
-              <a:t>Check if the library</a:t>
-            </a:r>
-            <a:r>
-              <a:rPr lang="zh-TW" altLang="en-US" dirty="0"/>
-              <a:t> </a:t>
-            </a:r>
-            <a:r>
-              <a:rPr lang="en-US" altLang="zh-TW" dirty="0"/>
-              <a:t>is installed correctly</a:t>
+              <a:t>Download form its </a:t>
+            </a:r>
+            <a:r>
+              <a:rPr lang="en-US" altLang="zh-TW" dirty="0" err="1"/>
+              <a:t>Github</a:t>
             </a:r>
             <a:br>
               <a:rPr lang="en-US" altLang="zh-TW" dirty="0"/>
             </a:br>
-            <a:r>
-              <a:rPr lang="en-US" altLang="zh-TW" dirty="0"/>
-              <a:t>You will see "</a:t>
-            </a:r>
-            <a:r>
-              <a:rPr lang="en-US" altLang="zh-TW" dirty="0">
-                <a:solidFill>
-                  <a:srgbClr val="FF0000"/>
-                </a:solidFill>
-              </a:rPr>
-              <a:t>Library added to your libraries</a:t>
-            </a:r>
-            <a:r>
-              <a:rPr lang="en-US" altLang="zh-TW" dirty="0"/>
-              <a:t>"</a:t>
-            </a:r>
-            <a:r>
-              <a:rPr lang="en-US" altLang="zh-TW" dirty="0">
-                <a:solidFill>
-                  <a:srgbClr val="FF0000"/>
-                </a:solidFill>
-              </a:rPr>
-              <a:t> </a:t>
-            </a:r>
-            <a:r>
-              <a:rPr lang="en-US" altLang="zh-TW" dirty="0"/>
-              <a:t>in the notice window, which means the library is installed successfully.</a:t>
-            </a:r>
-            <a:br>
-              <a:rPr lang="en-US" altLang="zh-TW" dirty="0"/>
-            </a:br>
-            <a:endParaRPr lang="zh-TW" altLang="en-US" dirty="0"/>
+            <a:endParaRPr lang="en-US" altLang="zh-TW" dirty="0"/>
+          </a:p>
+          <a:p>
+            <a:pPr marL="514350" indent="-514350">
+              <a:buFont typeface="+mj-lt"/>
+              <a:buAutoNum type="arabicPeriod"/>
+            </a:pPr>
+            <a:endParaRPr lang="en-US" altLang="zh-TW" dirty="0"/>
           </a:p>
         </p:txBody>
       </p:sp>
       <p:pic>
         <p:nvPicPr>
-          <p:cNvPr id="6" name="圖片 5">
-            <a:extLst>
-              <a:ext uri="{FF2B5EF4-FFF2-40B4-BE49-F238E27FC236}">
-                <a16:creationId xmlns:a16="http://schemas.microsoft.com/office/drawing/2014/main" id="{63557180-F90A-480F-80BB-164ABC1B91A6}"/>
+          <p:cNvPr id="12" name="圖片 11">
+            <a:extLst>
+              <a:ext uri="{FF2B5EF4-FFF2-40B4-BE49-F238E27FC236}">
+                <a16:creationId xmlns:a16="http://schemas.microsoft.com/office/drawing/2014/main" id="{F65A24CB-6745-4ED1-A4A5-6BBD00F874F6}"/>
               </a:ext>
             </a:extLst>
           </p:cNvPr>
@@ -16226,8 +16114,8 @@
         </p:blipFill>
         <p:spPr>
           <a:xfrm>
-            <a:off x="1560657" y="3429000"/>
-            <a:ext cx="8733333" cy="2628571"/>
+            <a:off x="1439475" y="2882396"/>
+            <a:ext cx="7306695" cy="3610479"/>
           </a:xfrm>
           <a:prstGeom prst="rect">
             <a:avLst/>
@@ -16247,7 +16135,7 @@
           <p:cNvPr id="4" name="投影片編號版面配置區 3">
             <a:extLst>
               <a:ext uri="{FF2B5EF4-FFF2-40B4-BE49-F238E27FC236}">
-                <a16:creationId xmlns:a16="http://schemas.microsoft.com/office/drawing/2014/main" id="{028B989F-B8A5-4A49-82D9-7AEB8B910C54}"/>
+                <a16:creationId xmlns:a16="http://schemas.microsoft.com/office/drawing/2014/main" id="{AFE6928E-F101-437A-A225-15F71DC6659A}"/>
               </a:ext>
             </a:extLst>
           </p:cNvPr>
@@ -16274,7 +16162,7 @@
     </p:spTree>
     <p:extLst>
       <p:ext uri="{BB962C8B-B14F-4D97-AF65-F5344CB8AC3E}">
-        <p14:creationId xmlns:p14="http://schemas.microsoft.com/office/powerpoint/2010/main" val="603082467"/>
+        <p14:creationId xmlns:p14="http://schemas.microsoft.com/office/powerpoint/2010/main" val="4238003250"/>
       </p:ext>
     </p:extLst>
   </p:cSld>
@@ -16306,7 +16194,7 @@
           <p:cNvPr id="2" name="標題 1">
             <a:extLst>
               <a:ext uri="{FF2B5EF4-FFF2-40B4-BE49-F238E27FC236}">
-                <a16:creationId xmlns:a16="http://schemas.microsoft.com/office/drawing/2014/main" id="{3B775320-2F25-4011-A29B-406017C4ED1E}"/>
+                <a16:creationId xmlns:a16="http://schemas.microsoft.com/office/drawing/2014/main" id="{1F518B19-5CE4-4E9E-ABA9-EADE29DE5761}"/>
               </a:ext>
             </a:extLst>
           </p:cNvPr>
@@ -16317,30 +16205,18 @@
             <p:ph type="title"/>
           </p:nvPr>
         </p:nvSpPr>
-        <p:spPr>
-          <a:xfrm>
-            <a:off x="417250" y="0"/>
-            <a:ext cx="11629748" cy="1325563"/>
-          </a:xfrm>
-        </p:spPr>
+        <p:spPr/>
         <p:txBody>
           <a:bodyPr>
             <a:normAutofit/>
           </a:bodyPr>
           <a:lstStyle/>
           <a:p>
-            <a:pPr algn="ctr"/>
-            <a:r>
-              <a:rPr lang="en-US" altLang="zh-TW" sz="2800" dirty="0"/>
-              <a:t>Example code on </a:t>
-            </a:r>
-            <a:r>
-              <a:rPr lang="en-US" altLang="zh-TW" sz="2800" dirty="0">
-                <a:hlinkClick r:id="rId2"/>
-              </a:rPr>
-              <a:t>https://github.com/Yuki23329626/iot-learning</a:t>
-            </a:r>
-            <a:endParaRPr lang="zh-TW" altLang="en-US" sz="2800" dirty="0"/>
+            <a:r>
+              <a:rPr lang="en-US" altLang="zh-TW" sz="4000" dirty="0"/>
+              <a:t>How to install custom library for Arduino IDE</a:t>
+            </a:r>
+            <a:endParaRPr lang="zh-TW" altLang="en-US" sz="4000" dirty="0"/>
           </a:p>
         </p:txBody>
       </p:sp>
@@ -16349,7 +16225,7 @@
           <p:cNvPr id="3" name="內容版面配置區 2">
             <a:extLst>
               <a:ext uri="{FF2B5EF4-FFF2-40B4-BE49-F238E27FC236}">
-                <a16:creationId xmlns:a16="http://schemas.microsoft.com/office/drawing/2014/main" id="{94D6FC82-A3CB-4D5A-B094-4D846483C27D}"/>
+                <a16:creationId xmlns:a16="http://schemas.microsoft.com/office/drawing/2014/main" id="{3686DCE9-A502-4B3A-8682-B9B4829522D3}"/>
               </a:ext>
             </a:extLst>
           </p:cNvPr>
@@ -16365,16 +16241,24 @@
           <a:bodyPr/>
           <a:lstStyle/>
           <a:p>
-            <a:endParaRPr lang="en-US" altLang="zh-TW" dirty="0"/>
+            <a:pPr marL="514350" indent="-514350">
+              <a:buFont typeface="+mj-lt"/>
+              <a:buAutoNum type="arabicPeriod" startAt="2"/>
+            </a:pPr>
+            <a:r>
+              <a:rPr lang="en-US" altLang="zh-TW" dirty="0"/>
+              <a:t>Add the library</a:t>
+            </a:r>
+            <a:endParaRPr lang="zh-TW" altLang="en-US" dirty="0"/>
           </a:p>
         </p:txBody>
       </p:sp>
       <p:pic>
         <p:nvPicPr>
-          <p:cNvPr id="4" name="圖片 3">
-            <a:extLst>
-              <a:ext uri="{FF2B5EF4-FFF2-40B4-BE49-F238E27FC236}">
-                <a16:creationId xmlns:a16="http://schemas.microsoft.com/office/drawing/2014/main" id="{0DFD55B2-F703-4330-B30C-F1EDD37E0AAA}"/>
+          <p:cNvPr id="7" name="圖片 6">
+            <a:extLst>
+              <a:ext uri="{FF2B5EF4-FFF2-40B4-BE49-F238E27FC236}">
+                <a16:creationId xmlns:a16="http://schemas.microsoft.com/office/drawing/2014/main" id="{CE2B6A8B-4144-4942-B695-2FF67F454BA2}"/>
               </a:ext>
             </a:extLst>
           </p:cNvPr>
@@ -16383,56 +16267,34 @@
           </p:cNvPicPr>
           <p:nvPr/>
         </p:nvPicPr>
-        <p:blipFill rotWithShape="1">
-          <a:blip r:embed="rId3"/>
-          <a:srcRect r="7407" b="14045"/>
-          <a:stretch/>
+        <p:blipFill>
+          <a:blip r:embed="rId2">
+            <a:extLst>
+              <a:ext uri="{28A0092B-C50C-407E-A947-70E740481C1C}">
+                <a14:useLocalDpi xmlns:a14="http://schemas.microsoft.com/office/drawing/2010/main" val="0"/>
+              </a:ext>
+            </a:extLst>
+          </a:blip>
+          <a:stretch>
+            <a:fillRect/>
+          </a:stretch>
         </p:blipFill>
         <p:spPr>
           <a:xfrm>
-            <a:off x="0" y="963227"/>
-            <a:ext cx="5861538" cy="5894773"/>
+            <a:off x="1419624" y="2364624"/>
+            <a:ext cx="7133333" cy="4028571"/>
           </a:xfrm>
           <a:prstGeom prst="rect">
             <a:avLst/>
           </a:prstGeom>
         </p:spPr>
       </p:pic>
-      <p:pic>
-        <p:nvPicPr>
-          <p:cNvPr id="5" name="圖片 4">
-            <a:extLst>
-              <a:ext uri="{FF2B5EF4-FFF2-40B4-BE49-F238E27FC236}">
-                <a16:creationId xmlns:a16="http://schemas.microsoft.com/office/drawing/2014/main" id="{711D12EE-9852-484C-B491-1B4A3B273BD2}"/>
-              </a:ext>
-            </a:extLst>
-          </p:cNvPr>
-          <p:cNvPicPr>
-            <a:picLocks noChangeAspect="1"/>
-          </p:cNvPicPr>
-          <p:nvPr/>
-        </p:nvPicPr>
-        <p:blipFill rotWithShape="1">
-          <a:blip r:embed="rId4"/>
-          <a:srcRect b="14045"/>
-          <a:stretch/>
-        </p:blipFill>
-        <p:spPr>
-          <a:xfrm>
-            <a:off x="5861538" y="963226"/>
-            <a:ext cx="6330462" cy="5894773"/>
-          </a:xfrm>
-          <a:prstGeom prst="rect">
-            <a:avLst/>
-          </a:prstGeom>
-        </p:spPr>
-      </p:pic>
-      <p:sp>
-        <p:nvSpPr>
-          <p:cNvPr id="6" name="投影片編號版面配置區 5">
-            <a:extLst>
-              <a:ext uri="{FF2B5EF4-FFF2-40B4-BE49-F238E27FC236}">
-                <a16:creationId xmlns:a16="http://schemas.microsoft.com/office/drawing/2014/main" id="{2CAA0417-A0A0-4490-A6CA-626F541328C9}"/>
+      <p:sp>
+        <p:nvSpPr>
+          <p:cNvPr id="4" name="投影片編號版面配置區 3">
+            <a:extLst>
+              <a:ext uri="{FF2B5EF4-FFF2-40B4-BE49-F238E27FC236}">
+                <a16:creationId xmlns:a16="http://schemas.microsoft.com/office/drawing/2014/main" id="{4DE14F45-F8B1-40F0-8668-DCD14BB0EA78}"/>
               </a:ext>
             </a:extLst>
           </p:cNvPr>
@@ -16459,7 +16321,7 @@
     </p:spTree>
     <p:extLst>
       <p:ext uri="{BB962C8B-B14F-4D97-AF65-F5344CB8AC3E}">
-        <p14:creationId xmlns:p14="http://schemas.microsoft.com/office/powerpoint/2010/main" val="1185766584"/>
+        <p14:creationId xmlns:p14="http://schemas.microsoft.com/office/powerpoint/2010/main" val="3211620007"/>
       </p:ext>
     </p:extLst>
   </p:cSld>
@@ -16491,6 +16353,400 @@
           <p:cNvPr id="2" name="標題 1">
             <a:extLst>
               <a:ext uri="{FF2B5EF4-FFF2-40B4-BE49-F238E27FC236}">
+                <a16:creationId xmlns:a16="http://schemas.microsoft.com/office/drawing/2014/main" id="{9564A15C-84C2-4625-86FE-E47D0298E067}"/>
+              </a:ext>
+            </a:extLst>
+          </p:cNvPr>
+          <p:cNvSpPr>
+            <a:spLocks noGrp="1"/>
+          </p:cNvSpPr>
+          <p:nvPr>
+            <p:ph type="title"/>
+          </p:nvPr>
+        </p:nvSpPr>
+        <p:spPr/>
+        <p:txBody>
+          <a:bodyPr>
+            <a:normAutofit/>
+          </a:bodyPr>
+          <a:lstStyle/>
+          <a:p>
+            <a:r>
+              <a:rPr lang="en-US" altLang="zh-TW" sz="4000" dirty="0"/>
+              <a:t>How to install custom library for Arduino IDE</a:t>
+            </a:r>
+            <a:endParaRPr lang="zh-TW" altLang="en-US" sz="4000" dirty="0"/>
+          </a:p>
+        </p:txBody>
+      </p:sp>
+      <p:sp>
+        <p:nvSpPr>
+          <p:cNvPr id="3" name="內容版面配置區 2">
+            <a:extLst>
+              <a:ext uri="{FF2B5EF4-FFF2-40B4-BE49-F238E27FC236}">
+                <a16:creationId xmlns:a16="http://schemas.microsoft.com/office/drawing/2014/main" id="{2DC0AEA2-67E8-4505-BE38-35BC4C47456E}"/>
+              </a:ext>
+            </a:extLst>
+          </p:cNvPr>
+          <p:cNvSpPr>
+            <a:spLocks noGrp="1"/>
+          </p:cNvSpPr>
+          <p:nvPr>
+            <p:ph idx="1"/>
+          </p:nvPr>
+        </p:nvSpPr>
+        <p:spPr/>
+        <p:txBody>
+          <a:bodyPr/>
+          <a:lstStyle/>
+          <a:p>
+            <a:pPr marL="514350" indent="-514350">
+              <a:buFont typeface="+mj-lt"/>
+              <a:buAutoNum type="arabicPeriod" startAt="3"/>
+            </a:pPr>
+            <a:r>
+              <a:rPr lang="en-US" altLang="zh-TW" dirty="0"/>
+              <a:t>Check if the library</a:t>
+            </a:r>
+            <a:r>
+              <a:rPr lang="zh-TW" altLang="en-US" dirty="0"/>
+              <a:t> </a:t>
+            </a:r>
+            <a:r>
+              <a:rPr lang="en-US" altLang="zh-TW" dirty="0"/>
+              <a:t>is installed correctly</a:t>
+            </a:r>
+            <a:br>
+              <a:rPr lang="en-US" altLang="zh-TW" dirty="0"/>
+            </a:br>
+            <a:r>
+              <a:rPr lang="en-US" altLang="zh-TW" dirty="0"/>
+              <a:t>You will see "</a:t>
+            </a:r>
+            <a:r>
+              <a:rPr lang="en-US" altLang="zh-TW" dirty="0">
+                <a:solidFill>
+                  <a:srgbClr val="FF0000"/>
+                </a:solidFill>
+              </a:rPr>
+              <a:t>Library added to your libraries</a:t>
+            </a:r>
+            <a:r>
+              <a:rPr lang="en-US" altLang="zh-TW" dirty="0"/>
+              <a:t>"</a:t>
+            </a:r>
+            <a:r>
+              <a:rPr lang="en-US" altLang="zh-TW" dirty="0">
+                <a:solidFill>
+                  <a:srgbClr val="FF0000"/>
+                </a:solidFill>
+              </a:rPr>
+              <a:t> </a:t>
+            </a:r>
+            <a:r>
+              <a:rPr lang="en-US" altLang="zh-TW" dirty="0"/>
+              <a:t>in the notice window, which means the library is installed successfully.</a:t>
+            </a:r>
+            <a:br>
+              <a:rPr lang="en-US" altLang="zh-TW" dirty="0"/>
+            </a:br>
+            <a:endParaRPr lang="zh-TW" altLang="en-US" dirty="0"/>
+          </a:p>
+        </p:txBody>
+      </p:sp>
+      <p:pic>
+        <p:nvPicPr>
+          <p:cNvPr id="6" name="圖片 5">
+            <a:extLst>
+              <a:ext uri="{FF2B5EF4-FFF2-40B4-BE49-F238E27FC236}">
+                <a16:creationId xmlns:a16="http://schemas.microsoft.com/office/drawing/2014/main" id="{63557180-F90A-480F-80BB-164ABC1B91A6}"/>
+              </a:ext>
+            </a:extLst>
+          </p:cNvPr>
+          <p:cNvPicPr>
+            <a:picLocks noChangeAspect="1"/>
+          </p:cNvPicPr>
+          <p:nvPr/>
+        </p:nvPicPr>
+        <p:blipFill>
+          <a:blip r:embed="rId2">
+            <a:extLst>
+              <a:ext uri="{28A0092B-C50C-407E-A947-70E740481C1C}">
+                <a14:useLocalDpi xmlns:a14="http://schemas.microsoft.com/office/drawing/2010/main" val="0"/>
+              </a:ext>
+            </a:extLst>
+          </a:blip>
+          <a:stretch>
+            <a:fillRect/>
+          </a:stretch>
+        </p:blipFill>
+        <p:spPr>
+          <a:xfrm>
+            <a:off x="1560657" y="3429000"/>
+            <a:ext cx="8733333" cy="2628571"/>
+          </a:xfrm>
+          <a:prstGeom prst="rect">
+            <a:avLst/>
+          </a:prstGeom>
+          <a:ln w="28575">
+            <a:solidFill>
+              <a:schemeClr val="tx1">
+                <a:lumMod val="50000"/>
+                <a:lumOff val="50000"/>
+              </a:schemeClr>
+            </a:solidFill>
+          </a:ln>
+        </p:spPr>
+      </p:pic>
+      <p:sp>
+        <p:nvSpPr>
+          <p:cNvPr id="4" name="投影片編號版面配置區 3">
+            <a:extLst>
+              <a:ext uri="{FF2B5EF4-FFF2-40B4-BE49-F238E27FC236}">
+                <a16:creationId xmlns:a16="http://schemas.microsoft.com/office/drawing/2014/main" id="{028B989F-B8A5-4A49-82D9-7AEB8B910C54}"/>
+              </a:ext>
+            </a:extLst>
+          </p:cNvPr>
+          <p:cNvSpPr>
+            <a:spLocks noGrp="1"/>
+          </p:cNvSpPr>
+          <p:nvPr>
+            <p:ph type="sldNum" sz="quarter" idx="12"/>
+          </p:nvPr>
+        </p:nvSpPr>
+        <p:spPr/>
+        <p:txBody>
+          <a:bodyPr/>
+          <a:lstStyle/>
+          <a:p>
+            <a:fld id="{80138FBE-9955-4D1C-8906-9613BD84A1A0}" type="slidenum">
+              <a:rPr lang="zh-TW" altLang="en-US" smtClean="0"/>
+              <a:t>46</a:t>
+            </a:fld>
+            <a:endParaRPr lang="zh-TW" altLang="en-US"/>
+          </a:p>
+        </p:txBody>
+      </p:sp>
+    </p:spTree>
+    <p:extLst>
+      <p:ext uri="{BB962C8B-B14F-4D97-AF65-F5344CB8AC3E}">
+        <p14:creationId xmlns:p14="http://schemas.microsoft.com/office/powerpoint/2010/main" val="603082467"/>
+      </p:ext>
+    </p:extLst>
+  </p:cSld>
+  <p:clrMapOvr>
+    <a:masterClrMapping/>
+  </p:clrMapOvr>
+</p:sld>
+</file>
+
+<file path=ppt/slides/slide47.xml><?xml version="1.0" encoding="utf-8"?>
+<p:sld xmlns:a="http://schemas.openxmlformats.org/drawingml/2006/main" xmlns:r="http://schemas.openxmlformats.org/officeDocument/2006/relationships" xmlns:p="http://schemas.openxmlformats.org/presentationml/2006/main">
+  <p:cSld>
+    <p:spTree>
+      <p:nvGrpSpPr>
+        <p:cNvPr id="1" name=""/>
+        <p:cNvGrpSpPr/>
+        <p:nvPr/>
+      </p:nvGrpSpPr>
+      <p:grpSpPr>
+        <a:xfrm>
+          <a:off x="0" y="0"/>
+          <a:ext cx="0" cy="0"/>
+          <a:chOff x="0" y="0"/>
+          <a:chExt cx="0" cy="0"/>
+        </a:xfrm>
+      </p:grpSpPr>
+      <p:sp>
+        <p:nvSpPr>
+          <p:cNvPr id="2" name="標題 1">
+            <a:extLst>
+              <a:ext uri="{FF2B5EF4-FFF2-40B4-BE49-F238E27FC236}">
+                <a16:creationId xmlns:a16="http://schemas.microsoft.com/office/drawing/2014/main" id="{3B775320-2F25-4011-A29B-406017C4ED1E}"/>
+              </a:ext>
+            </a:extLst>
+          </p:cNvPr>
+          <p:cNvSpPr>
+            <a:spLocks noGrp="1"/>
+          </p:cNvSpPr>
+          <p:nvPr>
+            <p:ph type="title"/>
+          </p:nvPr>
+        </p:nvSpPr>
+        <p:spPr>
+          <a:xfrm>
+            <a:off x="417250" y="0"/>
+            <a:ext cx="11629748" cy="1325563"/>
+          </a:xfrm>
+        </p:spPr>
+        <p:txBody>
+          <a:bodyPr>
+            <a:normAutofit/>
+          </a:bodyPr>
+          <a:lstStyle/>
+          <a:p>
+            <a:pPr algn="ctr"/>
+            <a:r>
+              <a:rPr lang="en-US" altLang="zh-TW" sz="2800" dirty="0"/>
+              <a:t>Example code on </a:t>
+            </a:r>
+            <a:r>
+              <a:rPr lang="en-US" altLang="zh-TW" sz="2800" dirty="0">
+                <a:hlinkClick r:id="rId2"/>
+              </a:rPr>
+              <a:t>https://github.com/Yuki23329626/iot-learning</a:t>
+            </a:r>
+            <a:endParaRPr lang="zh-TW" altLang="en-US" sz="2800" dirty="0"/>
+          </a:p>
+        </p:txBody>
+      </p:sp>
+      <p:sp>
+        <p:nvSpPr>
+          <p:cNvPr id="3" name="內容版面配置區 2">
+            <a:extLst>
+              <a:ext uri="{FF2B5EF4-FFF2-40B4-BE49-F238E27FC236}">
+                <a16:creationId xmlns:a16="http://schemas.microsoft.com/office/drawing/2014/main" id="{94D6FC82-A3CB-4D5A-B094-4D846483C27D}"/>
+              </a:ext>
+            </a:extLst>
+          </p:cNvPr>
+          <p:cNvSpPr>
+            <a:spLocks noGrp="1"/>
+          </p:cNvSpPr>
+          <p:nvPr>
+            <p:ph idx="1"/>
+          </p:nvPr>
+        </p:nvSpPr>
+        <p:spPr/>
+        <p:txBody>
+          <a:bodyPr/>
+          <a:lstStyle/>
+          <a:p>
+            <a:endParaRPr lang="en-US" altLang="zh-TW" dirty="0"/>
+          </a:p>
+        </p:txBody>
+      </p:sp>
+      <p:pic>
+        <p:nvPicPr>
+          <p:cNvPr id="4" name="圖片 3">
+            <a:extLst>
+              <a:ext uri="{FF2B5EF4-FFF2-40B4-BE49-F238E27FC236}">
+                <a16:creationId xmlns:a16="http://schemas.microsoft.com/office/drawing/2014/main" id="{0DFD55B2-F703-4330-B30C-F1EDD37E0AAA}"/>
+              </a:ext>
+            </a:extLst>
+          </p:cNvPr>
+          <p:cNvPicPr>
+            <a:picLocks noChangeAspect="1"/>
+          </p:cNvPicPr>
+          <p:nvPr/>
+        </p:nvPicPr>
+        <p:blipFill rotWithShape="1">
+          <a:blip r:embed="rId3"/>
+          <a:srcRect r="7407" b="14045"/>
+          <a:stretch/>
+        </p:blipFill>
+        <p:spPr>
+          <a:xfrm>
+            <a:off x="0" y="963227"/>
+            <a:ext cx="5861538" cy="5894773"/>
+          </a:xfrm>
+          <a:prstGeom prst="rect">
+            <a:avLst/>
+          </a:prstGeom>
+        </p:spPr>
+      </p:pic>
+      <p:pic>
+        <p:nvPicPr>
+          <p:cNvPr id="5" name="圖片 4">
+            <a:extLst>
+              <a:ext uri="{FF2B5EF4-FFF2-40B4-BE49-F238E27FC236}">
+                <a16:creationId xmlns:a16="http://schemas.microsoft.com/office/drawing/2014/main" id="{711D12EE-9852-484C-B491-1B4A3B273BD2}"/>
+              </a:ext>
+            </a:extLst>
+          </p:cNvPr>
+          <p:cNvPicPr>
+            <a:picLocks noChangeAspect="1"/>
+          </p:cNvPicPr>
+          <p:nvPr/>
+        </p:nvPicPr>
+        <p:blipFill rotWithShape="1">
+          <a:blip r:embed="rId4"/>
+          <a:srcRect b="14045"/>
+          <a:stretch/>
+        </p:blipFill>
+        <p:spPr>
+          <a:xfrm>
+            <a:off x="5861538" y="963226"/>
+            <a:ext cx="6330462" cy="5894773"/>
+          </a:xfrm>
+          <a:prstGeom prst="rect">
+            <a:avLst/>
+          </a:prstGeom>
+        </p:spPr>
+      </p:pic>
+      <p:sp>
+        <p:nvSpPr>
+          <p:cNvPr id="6" name="投影片編號版面配置區 5">
+            <a:extLst>
+              <a:ext uri="{FF2B5EF4-FFF2-40B4-BE49-F238E27FC236}">
+                <a16:creationId xmlns:a16="http://schemas.microsoft.com/office/drawing/2014/main" id="{2CAA0417-A0A0-4490-A6CA-626F541328C9}"/>
+              </a:ext>
+            </a:extLst>
+          </p:cNvPr>
+          <p:cNvSpPr>
+            <a:spLocks noGrp="1"/>
+          </p:cNvSpPr>
+          <p:nvPr>
+            <p:ph type="sldNum" sz="quarter" idx="12"/>
+          </p:nvPr>
+        </p:nvSpPr>
+        <p:spPr/>
+        <p:txBody>
+          <a:bodyPr/>
+          <a:lstStyle/>
+          <a:p>
+            <a:fld id="{80138FBE-9955-4D1C-8906-9613BD84A1A0}" type="slidenum">
+              <a:rPr lang="zh-TW" altLang="en-US" smtClean="0"/>
+              <a:t>47</a:t>
+            </a:fld>
+            <a:endParaRPr lang="zh-TW" altLang="en-US"/>
+          </a:p>
+        </p:txBody>
+      </p:sp>
+    </p:spTree>
+    <p:extLst>
+      <p:ext uri="{BB962C8B-B14F-4D97-AF65-F5344CB8AC3E}">
+        <p14:creationId xmlns:p14="http://schemas.microsoft.com/office/powerpoint/2010/main" val="1185766584"/>
+      </p:ext>
+    </p:extLst>
+  </p:cSld>
+  <p:clrMapOvr>
+    <a:masterClrMapping/>
+  </p:clrMapOvr>
+</p:sld>
+</file>
+
+<file path=ppt/slides/slide48.xml><?xml version="1.0" encoding="utf-8"?>
+<p:sld xmlns:a="http://schemas.openxmlformats.org/drawingml/2006/main" xmlns:r="http://schemas.openxmlformats.org/officeDocument/2006/relationships" xmlns:p="http://schemas.openxmlformats.org/presentationml/2006/main">
+  <p:cSld>
+    <p:spTree>
+      <p:nvGrpSpPr>
+        <p:cNvPr id="1" name=""/>
+        <p:cNvGrpSpPr/>
+        <p:nvPr/>
+      </p:nvGrpSpPr>
+      <p:grpSpPr>
+        <a:xfrm>
+          <a:off x="0" y="0"/>
+          <a:ext cx="0" cy="0"/>
+          <a:chOff x="0" y="0"/>
+          <a:chExt cx="0" cy="0"/>
+        </a:xfrm>
+      </p:grpSpPr>
+      <p:sp>
+        <p:nvSpPr>
+          <p:cNvPr id="2" name="標題 1">
+            <a:extLst>
+              <a:ext uri="{FF2B5EF4-FFF2-40B4-BE49-F238E27FC236}">
                 <a16:creationId xmlns:a16="http://schemas.microsoft.com/office/drawing/2014/main" id="{021AD420-F1AE-401C-8AC6-4F980B60A869}"/>
               </a:ext>
             </a:extLst>
@@ -16616,7 +16872,7 @@
           <a:p>
             <a:fld id="{80138FBE-9955-4D1C-8906-9613BD84A1A0}" type="slidenum">
               <a:rPr lang="zh-TW" altLang="en-US" smtClean="0"/>
-              <a:t>46</a:t>
+              <a:t>48</a:t>
             </a:fld>
             <a:endParaRPr lang="zh-TW" altLang="en-US"/>
           </a:p>
@@ -16635,7 +16891,7 @@
 </p:sld>
 </file>
 
-<file path=ppt/slides/slide47.xml><?xml version="1.0" encoding="utf-8"?>
+<file path=ppt/slides/slide49.xml><?xml version="1.0" encoding="utf-8"?>
 <p:sld xmlns:a="http://schemas.openxmlformats.org/drawingml/2006/main" xmlns:r="http://schemas.openxmlformats.org/officeDocument/2006/relationships" xmlns:p="http://schemas.openxmlformats.org/presentationml/2006/main">
   <p:cSld>
     <p:spTree>
@@ -16798,7 +17054,7 @@
           <a:p>
             <a:fld id="{80138FBE-9955-4D1C-8906-9613BD84A1A0}" type="slidenum">
               <a:rPr lang="zh-TW" altLang="en-US" smtClean="0"/>
-              <a:t>47</a:t>
+              <a:t>49</a:t>
             </a:fld>
             <a:endParaRPr lang="zh-TW" altLang="en-US"/>
           </a:p>
@@ -16808,336 +17064,6 @@
     <p:extLst>
       <p:ext uri="{BB962C8B-B14F-4D97-AF65-F5344CB8AC3E}">
         <p14:creationId xmlns:p14="http://schemas.microsoft.com/office/powerpoint/2010/main" val="1898018761"/>
-      </p:ext>
-    </p:extLst>
-  </p:cSld>
-  <p:clrMapOvr>
-    <a:masterClrMapping/>
-  </p:clrMapOvr>
-</p:sld>
-</file>
-
-<file path=ppt/slides/slide48.xml><?xml version="1.0" encoding="utf-8"?>
-<p:sld xmlns:a="http://schemas.openxmlformats.org/drawingml/2006/main" xmlns:r="http://schemas.openxmlformats.org/officeDocument/2006/relationships" xmlns:p="http://schemas.openxmlformats.org/presentationml/2006/main">
-  <p:cSld>
-    <p:spTree>
-      <p:nvGrpSpPr>
-        <p:cNvPr id="1" name=""/>
-        <p:cNvGrpSpPr/>
-        <p:nvPr/>
-      </p:nvGrpSpPr>
-      <p:grpSpPr>
-        <a:xfrm>
-          <a:off x="0" y="0"/>
-          <a:ext cx="0" cy="0"/>
-          <a:chOff x="0" y="0"/>
-          <a:chExt cx="0" cy="0"/>
-        </a:xfrm>
-      </p:grpSpPr>
-      <p:sp>
-        <p:nvSpPr>
-          <p:cNvPr id="2" name="標題 1">
-            <a:extLst>
-              <a:ext uri="{FF2B5EF4-FFF2-40B4-BE49-F238E27FC236}">
-                <a16:creationId xmlns:a16="http://schemas.microsoft.com/office/drawing/2014/main" id="{3C17E0F0-5028-438E-B2C1-46046F8F1982}"/>
-              </a:ext>
-            </a:extLst>
-          </p:cNvPr>
-          <p:cNvSpPr>
-            <a:spLocks noGrp="1"/>
-          </p:cNvSpPr>
-          <p:nvPr>
-            <p:ph type="title"/>
-          </p:nvPr>
-        </p:nvSpPr>
-        <p:spPr/>
-        <p:txBody>
-          <a:bodyPr/>
-          <a:lstStyle/>
-          <a:p>
-            <a:r>
-              <a:rPr lang="en-US" altLang="zh-TW" dirty="0"/>
-              <a:t>Example code – LED bar</a:t>
-            </a:r>
-            <a:endParaRPr lang="zh-TW" altLang="en-US" dirty="0"/>
-          </a:p>
-        </p:txBody>
-      </p:sp>
-      <p:sp>
-        <p:nvSpPr>
-          <p:cNvPr id="3" name="內容版面配置區 2">
-            <a:extLst>
-              <a:ext uri="{FF2B5EF4-FFF2-40B4-BE49-F238E27FC236}">
-                <a16:creationId xmlns:a16="http://schemas.microsoft.com/office/drawing/2014/main" id="{3236F798-2D5C-4032-B7F7-C5BD0630D8AB}"/>
-              </a:ext>
-            </a:extLst>
-          </p:cNvPr>
-          <p:cNvSpPr>
-            <a:spLocks noGrp="1"/>
-          </p:cNvSpPr>
-          <p:nvPr>
-            <p:ph idx="1"/>
-          </p:nvPr>
-        </p:nvSpPr>
-        <p:spPr/>
-        <p:txBody>
-          <a:bodyPr/>
-          <a:lstStyle/>
-          <a:p>
-            <a:endParaRPr lang="zh-TW" altLang="en-US" dirty="0"/>
-          </a:p>
-        </p:txBody>
-      </p:sp>
-      <p:pic>
-        <p:nvPicPr>
-          <p:cNvPr id="4" name="圖片 3">
-            <a:extLst>
-              <a:ext uri="{FF2B5EF4-FFF2-40B4-BE49-F238E27FC236}">
-                <a16:creationId xmlns:a16="http://schemas.microsoft.com/office/drawing/2014/main" id="{A98C4323-CF73-4724-A268-431F08D24BD0}"/>
-              </a:ext>
-            </a:extLst>
-          </p:cNvPr>
-          <p:cNvPicPr>
-            <a:picLocks noChangeAspect="1"/>
-          </p:cNvPicPr>
-          <p:nvPr/>
-        </p:nvPicPr>
-        <p:blipFill rotWithShape="1">
-          <a:blip r:embed="rId2"/>
-          <a:srcRect b="36551"/>
-          <a:stretch/>
-        </p:blipFill>
-        <p:spPr>
-          <a:xfrm>
-            <a:off x="2930769" y="1825625"/>
-            <a:ext cx="6330462" cy="4351338"/>
-          </a:xfrm>
-          <a:prstGeom prst="rect">
-            <a:avLst/>
-          </a:prstGeom>
-        </p:spPr>
-      </p:pic>
-      <p:sp>
-        <p:nvSpPr>
-          <p:cNvPr id="5" name="投影片編號版面配置區 4">
-            <a:extLst>
-              <a:ext uri="{FF2B5EF4-FFF2-40B4-BE49-F238E27FC236}">
-                <a16:creationId xmlns:a16="http://schemas.microsoft.com/office/drawing/2014/main" id="{B2ACC1F5-1675-437C-A718-1FF618741450}"/>
-              </a:ext>
-            </a:extLst>
-          </p:cNvPr>
-          <p:cNvSpPr>
-            <a:spLocks noGrp="1"/>
-          </p:cNvSpPr>
-          <p:nvPr>
-            <p:ph type="sldNum" sz="quarter" idx="12"/>
-          </p:nvPr>
-        </p:nvSpPr>
-        <p:spPr/>
-        <p:txBody>
-          <a:bodyPr/>
-          <a:lstStyle/>
-          <a:p>
-            <a:fld id="{80138FBE-9955-4D1C-8906-9613BD84A1A0}" type="slidenum">
-              <a:rPr lang="zh-TW" altLang="en-US" smtClean="0"/>
-              <a:t>48</a:t>
-            </a:fld>
-            <a:endParaRPr lang="zh-TW" altLang="en-US"/>
-          </a:p>
-        </p:txBody>
-      </p:sp>
-    </p:spTree>
-    <p:extLst>
-      <p:ext uri="{BB962C8B-B14F-4D97-AF65-F5344CB8AC3E}">
-        <p14:creationId xmlns:p14="http://schemas.microsoft.com/office/powerpoint/2010/main" val="2657258968"/>
-      </p:ext>
-    </p:extLst>
-  </p:cSld>
-  <p:clrMapOvr>
-    <a:masterClrMapping/>
-  </p:clrMapOvr>
-</p:sld>
-</file>
-
-<file path=ppt/slides/slide49.xml><?xml version="1.0" encoding="utf-8"?>
-<p:sld xmlns:a="http://schemas.openxmlformats.org/drawingml/2006/main" xmlns:r="http://schemas.openxmlformats.org/officeDocument/2006/relationships" xmlns:p="http://schemas.openxmlformats.org/presentationml/2006/main">
-  <p:cSld>
-    <p:spTree>
-      <p:nvGrpSpPr>
-        <p:cNvPr id="1" name=""/>
-        <p:cNvGrpSpPr/>
-        <p:nvPr/>
-      </p:nvGrpSpPr>
-      <p:grpSpPr>
-        <a:xfrm>
-          <a:off x="0" y="0"/>
-          <a:ext cx="0" cy="0"/>
-          <a:chOff x="0" y="0"/>
-          <a:chExt cx="0" cy="0"/>
-        </a:xfrm>
-      </p:grpSpPr>
-      <p:sp>
-        <p:nvSpPr>
-          <p:cNvPr id="2" name="標題 1">
-            <a:extLst>
-              <a:ext uri="{FF2B5EF4-FFF2-40B4-BE49-F238E27FC236}">
-                <a16:creationId xmlns:a16="http://schemas.microsoft.com/office/drawing/2014/main" id="{75214301-3DB9-4B33-8478-4AB93F1D4AE7}"/>
-              </a:ext>
-            </a:extLst>
-          </p:cNvPr>
-          <p:cNvSpPr>
-            <a:spLocks noGrp="1"/>
-          </p:cNvSpPr>
-          <p:nvPr>
-            <p:ph type="title"/>
-          </p:nvPr>
-        </p:nvSpPr>
-        <p:spPr/>
-        <p:txBody>
-          <a:bodyPr/>
-          <a:lstStyle/>
-          <a:p>
-            <a:r>
-              <a:rPr lang="en-US" altLang="zh-TW" dirty="0"/>
-              <a:t>Finish</a:t>
-            </a:r>
-            <a:endParaRPr lang="zh-TW" altLang="en-US" dirty="0"/>
-          </a:p>
-        </p:txBody>
-      </p:sp>
-      <p:sp>
-        <p:nvSpPr>
-          <p:cNvPr id="3" name="內容版面配置區 2">
-            <a:extLst>
-              <a:ext uri="{FF2B5EF4-FFF2-40B4-BE49-F238E27FC236}">
-                <a16:creationId xmlns:a16="http://schemas.microsoft.com/office/drawing/2014/main" id="{DAE619A8-2A4A-4908-BFC1-40B6527F83B2}"/>
-              </a:ext>
-            </a:extLst>
-          </p:cNvPr>
-          <p:cNvSpPr>
-            <a:spLocks noGrp="1"/>
-          </p:cNvSpPr>
-          <p:nvPr>
-            <p:ph idx="1"/>
-          </p:nvPr>
-        </p:nvSpPr>
-        <p:spPr/>
-        <p:txBody>
-          <a:bodyPr/>
-          <a:lstStyle/>
-          <a:p>
-            <a:r>
-              <a:rPr lang="en-US" altLang="zh-TW" dirty="0"/>
-              <a:t>Now combine two parts together</a:t>
-            </a:r>
-          </a:p>
-          <a:p>
-            <a:r>
-              <a:rPr lang="en-US" altLang="zh-TW" dirty="0"/>
-              <a:t>Show the humidity through the LED Bar</a:t>
-            </a:r>
-            <a:endParaRPr lang="zh-TW" altLang="en-US" dirty="0"/>
-          </a:p>
-        </p:txBody>
-      </p:sp>
-      <p:pic>
-        <p:nvPicPr>
-          <p:cNvPr id="5" name="圖片 4">
-            <a:extLst>
-              <a:ext uri="{FF2B5EF4-FFF2-40B4-BE49-F238E27FC236}">
-                <a16:creationId xmlns:a16="http://schemas.microsoft.com/office/drawing/2014/main" id="{48E63C35-3A8B-4BEA-98A4-9442C0BC361D}"/>
-              </a:ext>
-            </a:extLst>
-          </p:cNvPr>
-          <p:cNvPicPr>
-            <a:picLocks noChangeAspect="1"/>
-          </p:cNvPicPr>
-          <p:nvPr/>
-        </p:nvPicPr>
-        <p:blipFill rotWithShape="1">
-          <a:blip r:embed="rId2">
-            <a:extLst>
-              <a:ext uri="{28A0092B-C50C-407E-A947-70E740481C1C}">
-                <a14:useLocalDpi xmlns:a14="http://schemas.microsoft.com/office/drawing/2010/main" val="0"/>
-              </a:ext>
-            </a:extLst>
-          </a:blip>
-          <a:srcRect l="8518" t="15663" r="26894" b="4078"/>
-          <a:stretch/>
-        </p:blipFill>
-        <p:spPr>
-          <a:xfrm>
-            <a:off x="1097871" y="2915936"/>
-            <a:ext cx="4998129" cy="3493618"/>
-          </a:xfrm>
-          <a:prstGeom prst="rect">
-            <a:avLst/>
-          </a:prstGeom>
-        </p:spPr>
-      </p:pic>
-      <p:sp>
-        <p:nvSpPr>
-          <p:cNvPr id="4" name="投影片編號版面配置區 3">
-            <a:extLst>
-              <a:ext uri="{FF2B5EF4-FFF2-40B4-BE49-F238E27FC236}">
-                <a16:creationId xmlns:a16="http://schemas.microsoft.com/office/drawing/2014/main" id="{4C40C7CD-C464-443D-920F-5FF33F46A521}"/>
-              </a:ext>
-            </a:extLst>
-          </p:cNvPr>
-          <p:cNvSpPr>
-            <a:spLocks noGrp="1"/>
-          </p:cNvSpPr>
-          <p:nvPr>
-            <p:ph type="sldNum" sz="quarter" idx="12"/>
-          </p:nvPr>
-        </p:nvSpPr>
-        <p:spPr/>
-        <p:txBody>
-          <a:bodyPr/>
-          <a:lstStyle/>
-          <a:p>
-            <a:fld id="{80138FBE-9955-4D1C-8906-9613BD84A1A0}" type="slidenum">
-              <a:rPr lang="zh-TW" altLang="en-US" smtClean="0"/>
-              <a:t>49</a:t>
-            </a:fld>
-            <a:endParaRPr lang="zh-TW" altLang="en-US"/>
-          </a:p>
-        </p:txBody>
-      </p:sp>
-      <p:pic>
-        <p:nvPicPr>
-          <p:cNvPr id="6" name="圖片 5">
-            <a:extLst>
-              <a:ext uri="{FF2B5EF4-FFF2-40B4-BE49-F238E27FC236}">
-                <a16:creationId xmlns:a16="http://schemas.microsoft.com/office/drawing/2014/main" id="{631AFEEA-B2F5-4811-A524-0F59AE578124}"/>
-              </a:ext>
-            </a:extLst>
-          </p:cNvPr>
-          <p:cNvPicPr>
-            <a:picLocks noChangeAspect="1"/>
-          </p:cNvPicPr>
-          <p:nvPr/>
-        </p:nvPicPr>
-        <p:blipFill>
-          <a:blip r:embed="rId3"/>
-          <a:stretch>
-            <a:fillRect/>
-          </a:stretch>
-        </p:blipFill>
-        <p:spPr>
-          <a:xfrm>
-            <a:off x="6256623" y="2915936"/>
-            <a:ext cx="5684496" cy="2858630"/>
-          </a:xfrm>
-          <a:prstGeom prst="rect">
-            <a:avLst/>
-          </a:prstGeom>
-        </p:spPr>
-      </p:pic>
-    </p:spTree>
-    <p:extLst>
-      <p:ext uri="{BB962C8B-B14F-4D97-AF65-F5344CB8AC3E}">
-        <p14:creationId xmlns:p14="http://schemas.microsoft.com/office/powerpoint/2010/main" val="3043238417"/>
       </p:ext>
     </p:extLst>
   </p:cSld>
@@ -18868,6 +18794,336 @@
 </p:sld>
 </file>
 
+<file path=ppt/slides/slide50.xml><?xml version="1.0" encoding="utf-8"?>
+<p:sld xmlns:a="http://schemas.openxmlformats.org/drawingml/2006/main" xmlns:r="http://schemas.openxmlformats.org/officeDocument/2006/relationships" xmlns:p="http://schemas.openxmlformats.org/presentationml/2006/main">
+  <p:cSld>
+    <p:spTree>
+      <p:nvGrpSpPr>
+        <p:cNvPr id="1" name=""/>
+        <p:cNvGrpSpPr/>
+        <p:nvPr/>
+      </p:nvGrpSpPr>
+      <p:grpSpPr>
+        <a:xfrm>
+          <a:off x="0" y="0"/>
+          <a:ext cx="0" cy="0"/>
+          <a:chOff x="0" y="0"/>
+          <a:chExt cx="0" cy="0"/>
+        </a:xfrm>
+      </p:grpSpPr>
+      <p:sp>
+        <p:nvSpPr>
+          <p:cNvPr id="2" name="標題 1">
+            <a:extLst>
+              <a:ext uri="{FF2B5EF4-FFF2-40B4-BE49-F238E27FC236}">
+                <a16:creationId xmlns:a16="http://schemas.microsoft.com/office/drawing/2014/main" id="{3C17E0F0-5028-438E-B2C1-46046F8F1982}"/>
+              </a:ext>
+            </a:extLst>
+          </p:cNvPr>
+          <p:cNvSpPr>
+            <a:spLocks noGrp="1"/>
+          </p:cNvSpPr>
+          <p:nvPr>
+            <p:ph type="title"/>
+          </p:nvPr>
+        </p:nvSpPr>
+        <p:spPr/>
+        <p:txBody>
+          <a:bodyPr/>
+          <a:lstStyle/>
+          <a:p>
+            <a:r>
+              <a:rPr lang="en-US" altLang="zh-TW" dirty="0"/>
+              <a:t>Example code – LED bar</a:t>
+            </a:r>
+            <a:endParaRPr lang="zh-TW" altLang="en-US" dirty="0"/>
+          </a:p>
+        </p:txBody>
+      </p:sp>
+      <p:sp>
+        <p:nvSpPr>
+          <p:cNvPr id="3" name="內容版面配置區 2">
+            <a:extLst>
+              <a:ext uri="{FF2B5EF4-FFF2-40B4-BE49-F238E27FC236}">
+                <a16:creationId xmlns:a16="http://schemas.microsoft.com/office/drawing/2014/main" id="{3236F798-2D5C-4032-B7F7-C5BD0630D8AB}"/>
+              </a:ext>
+            </a:extLst>
+          </p:cNvPr>
+          <p:cNvSpPr>
+            <a:spLocks noGrp="1"/>
+          </p:cNvSpPr>
+          <p:nvPr>
+            <p:ph idx="1"/>
+          </p:nvPr>
+        </p:nvSpPr>
+        <p:spPr/>
+        <p:txBody>
+          <a:bodyPr/>
+          <a:lstStyle/>
+          <a:p>
+            <a:endParaRPr lang="zh-TW" altLang="en-US" dirty="0"/>
+          </a:p>
+        </p:txBody>
+      </p:sp>
+      <p:pic>
+        <p:nvPicPr>
+          <p:cNvPr id="4" name="圖片 3">
+            <a:extLst>
+              <a:ext uri="{FF2B5EF4-FFF2-40B4-BE49-F238E27FC236}">
+                <a16:creationId xmlns:a16="http://schemas.microsoft.com/office/drawing/2014/main" id="{A98C4323-CF73-4724-A268-431F08D24BD0}"/>
+              </a:ext>
+            </a:extLst>
+          </p:cNvPr>
+          <p:cNvPicPr>
+            <a:picLocks noChangeAspect="1"/>
+          </p:cNvPicPr>
+          <p:nvPr/>
+        </p:nvPicPr>
+        <p:blipFill rotWithShape="1">
+          <a:blip r:embed="rId2"/>
+          <a:srcRect b="36551"/>
+          <a:stretch/>
+        </p:blipFill>
+        <p:spPr>
+          <a:xfrm>
+            <a:off x="2930769" y="1825625"/>
+            <a:ext cx="6330462" cy="4351338"/>
+          </a:xfrm>
+          <a:prstGeom prst="rect">
+            <a:avLst/>
+          </a:prstGeom>
+        </p:spPr>
+      </p:pic>
+      <p:sp>
+        <p:nvSpPr>
+          <p:cNvPr id="5" name="投影片編號版面配置區 4">
+            <a:extLst>
+              <a:ext uri="{FF2B5EF4-FFF2-40B4-BE49-F238E27FC236}">
+                <a16:creationId xmlns:a16="http://schemas.microsoft.com/office/drawing/2014/main" id="{B2ACC1F5-1675-437C-A718-1FF618741450}"/>
+              </a:ext>
+            </a:extLst>
+          </p:cNvPr>
+          <p:cNvSpPr>
+            <a:spLocks noGrp="1"/>
+          </p:cNvSpPr>
+          <p:nvPr>
+            <p:ph type="sldNum" sz="quarter" idx="12"/>
+          </p:nvPr>
+        </p:nvSpPr>
+        <p:spPr/>
+        <p:txBody>
+          <a:bodyPr/>
+          <a:lstStyle/>
+          <a:p>
+            <a:fld id="{80138FBE-9955-4D1C-8906-9613BD84A1A0}" type="slidenum">
+              <a:rPr lang="zh-TW" altLang="en-US" smtClean="0"/>
+              <a:t>50</a:t>
+            </a:fld>
+            <a:endParaRPr lang="zh-TW" altLang="en-US"/>
+          </a:p>
+        </p:txBody>
+      </p:sp>
+    </p:spTree>
+    <p:extLst>
+      <p:ext uri="{BB962C8B-B14F-4D97-AF65-F5344CB8AC3E}">
+        <p14:creationId xmlns:p14="http://schemas.microsoft.com/office/powerpoint/2010/main" val="2657258968"/>
+      </p:ext>
+    </p:extLst>
+  </p:cSld>
+  <p:clrMapOvr>
+    <a:masterClrMapping/>
+  </p:clrMapOvr>
+</p:sld>
+</file>
+
+<file path=ppt/slides/slide51.xml><?xml version="1.0" encoding="utf-8"?>
+<p:sld xmlns:a="http://schemas.openxmlformats.org/drawingml/2006/main" xmlns:r="http://schemas.openxmlformats.org/officeDocument/2006/relationships" xmlns:p="http://schemas.openxmlformats.org/presentationml/2006/main">
+  <p:cSld>
+    <p:spTree>
+      <p:nvGrpSpPr>
+        <p:cNvPr id="1" name=""/>
+        <p:cNvGrpSpPr/>
+        <p:nvPr/>
+      </p:nvGrpSpPr>
+      <p:grpSpPr>
+        <a:xfrm>
+          <a:off x="0" y="0"/>
+          <a:ext cx="0" cy="0"/>
+          <a:chOff x="0" y="0"/>
+          <a:chExt cx="0" cy="0"/>
+        </a:xfrm>
+      </p:grpSpPr>
+      <p:sp>
+        <p:nvSpPr>
+          <p:cNvPr id="2" name="標題 1">
+            <a:extLst>
+              <a:ext uri="{FF2B5EF4-FFF2-40B4-BE49-F238E27FC236}">
+                <a16:creationId xmlns:a16="http://schemas.microsoft.com/office/drawing/2014/main" id="{75214301-3DB9-4B33-8478-4AB93F1D4AE7}"/>
+              </a:ext>
+            </a:extLst>
+          </p:cNvPr>
+          <p:cNvSpPr>
+            <a:spLocks noGrp="1"/>
+          </p:cNvSpPr>
+          <p:nvPr>
+            <p:ph type="title"/>
+          </p:nvPr>
+        </p:nvSpPr>
+        <p:spPr/>
+        <p:txBody>
+          <a:bodyPr/>
+          <a:lstStyle/>
+          <a:p>
+            <a:r>
+              <a:rPr lang="en-US" altLang="zh-TW" dirty="0"/>
+              <a:t>Finish</a:t>
+            </a:r>
+            <a:endParaRPr lang="zh-TW" altLang="en-US" dirty="0"/>
+          </a:p>
+        </p:txBody>
+      </p:sp>
+      <p:sp>
+        <p:nvSpPr>
+          <p:cNvPr id="3" name="內容版面配置區 2">
+            <a:extLst>
+              <a:ext uri="{FF2B5EF4-FFF2-40B4-BE49-F238E27FC236}">
+                <a16:creationId xmlns:a16="http://schemas.microsoft.com/office/drawing/2014/main" id="{DAE619A8-2A4A-4908-BFC1-40B6527F83B2}"/>
+              </a:ext>
+            </a:extLst>
+          </p:cNvPr>
+          <p:cNvSpPr>
+            <a:spLocks noGrp="1"/>
+          </p:cNvSpPr>
+          <p:nvPr>
+            <p:ph idx="1"/>
+          </p:nvPr>
+        </p:nvSpPr>
+        <p:spPr/>
+        <p:txBody>
+          <a:bodyPr/>
+          <a:lstStyle/>
+          <a:p>
+            <a:r>
+              <a:rPr lang="en-US" altLang="zh-TW" dirty="0"/>
+              <a:t>Now combine two parts together</a:t>
+            </a:r>
+          </a:p>
+          <a:p>
+            <a:r>
+              <a:rPr lang="en-US" altLang="zh-TW" dirty="0"/>
+              <a:t>Show the humidity through the LED Bar</a:t>
+            </a:r>
+            <a:endParaRPr lang="zh-TW" altLang="en-US" dirty="0"/>
+          </a:p>
+        </p:txBody>
+      </p:sp>
+      <p:pic>
+        <p:nvPicPr>
+          <p:cNvPr id="5" name="圖片 4">
+            <a:extLst>
+              <a:ext uri="{FF2B5EF4-FFF2-40B4-BE49-F238E27FC236}">
+                <a16:creationId xmlns:a16="http://schemas.microsoft.com/office/drawing/2014/main" id="{48E63C35-3A8B-4BEA-98A4-9442C0BC361D}"/>
+              </a:ext>
+            </a:extLst>
+          </p:cNvPr>
+          <p:cNvPicPr>
+            <a:picLocks noChangeAspect="1"/>
+          </p:cNvPicPr>
+          <p:nvPr/>
+        </p:nvPicPr>
+        <p:blipFill rotWithShape="1">
+          <a:blip r:embed="rId2">
+            <a:extLst>
+              <a:ext uri="{28A0092B-C50C-407E-A947-70E740481C1C}">
+                <a14:useLocalDpi xmlns:a14="http://schemas.microsoft.com/office/drawing/2010/main" val="0"/>
+              </a:ext>
+            </a:extLst>
+          </a:blip>
+          <a:srcRect l="8518" t="15663" r="26894" b="4078"/>
+          <a:stretch/>
+        </p:blipFill>
+        <p:spPr>
+          <a:xfrm>
+            <a:off x="1097871" y="2915936"/>
+            <a:ext cx="4998129" cy="3493618"/>
+          </a:xfrm>
+          <a:prstGeom prst="rect">
+            <a:avLst/>
+          </a:prstGeom>
+        </p:spPr>
+      </p:pic>
+      <p:sp>
+        <p:nvSpPr>
+          <p:cNvPr id="4" name="投影片編號版面配置區 3">
+            <a:extLst>
+              <a:ext uri="{FF2B5EF4-FFF2-40B4-BE49-F238E27FC236}">
+                <a16:creationId xmlns:a16="http://schemas.microsoft.com/office/drawing/2014/main" id="{4C40C7CD-C464-443D-920F-5FF33F46A521}"/>
+              </a:ext>
+            </a:extLst>
+          </p:cNvPr>
+          <p:cNvSpPr>
+            <a:spLocks noGrp="1"/>
+          </p:cNvSpPr>
+          <p:nvPr>
+            <p:ph type="sldNum" sz="quarter" idx="12"/>
+          </p:nvPr>
+        </p:nvSpPr>
+        <p:spPr/>
+        <p:txBody>
+          <a:bodyPr/>
+          <a:lstStyle/>
+          <a:p>
+            <a:fld id="{80138FBE-9955-4D1C-8906-9613BD84A1A0}" type="slidenum">
+              <a:rPr lang="zh-TW" altLang="en-US" smtClean="0"/>
+              <a:t>51</a:t>
+            </a:fld>
+            <a:endParaRPr lang="zh-TW" altLang="en-US"/>
+          </a:p>
+        </p:txBody>
+      </p:sp>
+      <p:pic>
+        <p:nvPicPr>
+          <p:cNvPr id="6" name="圖片 5">
+            <a:extLst>
+              <a:ext uri="{FF2B5EF4-FFF2-40B4-BE49-F238E27FC236}">
+                <a16:creationId xmlns:a16="http://schemas.microsoft.com/office/drawing/2014/main" id="{631AFEEA-B2F5-4811-A524-0F59AE578124}"/>
+              </a:ext>
+            </a:extLst>
+          </p:cNvPr>
+          <p:cNvPicPr>
+            <a:picLocks noChangeAspect="1"/>
+          </p:cNvPicPr>
+          <p:nvPr/>
+        </p:nvPicPr>
+        <p:blipFill>
+          <a:blip r:embed="rId3"/>
+          <a:stretch>
+            <a:fillRect/>
+          </a:stretch>
+        </p:blipFill>
+        <p:spPr>
+          <a:xfrm>
+            <a:off x="6256623" y="2915936"/>
+            <a:ext cx="5684496" cy="2858630"/>
+          </a:xfrm>
+          <a:prstGeom prst="rect">
+            <a:avLst/>
+          </a:prstGeom>
+        </p:spPr>
+      </p:pic>
+    </p:spTree>
+    <p:extLst>
+      <p:ext uri="{BB962C8B-B14F-4D97-AF65-F5344CB8AC3E}">
+        <p14:creationId xmlns:p14="http://schemas.microsoft.com/office/powerpoint/2010/main" val="3043238417"/>
+      </p:ext>
+    </p:extLst>
+  </p:cSld>
+  <p:clrMapOvr>
+    <a:masterClrMapping/>
+  </p:clrMapOvr>
+</p:sld>
+</file>
+
 <file path=ppt/slides/slide6.xml><?xml version="1.0" encoding="utf-8"?>
 <p:sld xmlns:a="http://schemas.openxmlformats.org/drawingml/2006/main" xmlns:r="http://schemas.openxmlformats.org/officeDocument/2006/relationships" xmlns:p="http://schemas.openxmlformats.org/presentationml/2006/main">
   <p:cSld>

</xml_diff>